<commit_message>
wireframe updated, app top bar finished
</commit_message>
<xml_diff>
--- a/wireframe.pptx
+++ b/wireframe.pptx
@@ -3367,6 +3367,50 @@
       </p:sp>
       <p:sp>
         <p:nvSpPr>
+          <p:cNvPr id="40" name="Rectangle 39">
+            <a:extLst>
+              <a:ext uri="{FF2B5EF4-FFF2-40B4-BE49-F238E27FC236}">
+                <a16:creationId xmlns:a16="http://schemas.microsoft.com/office/drawing/2014/main" id="{C18B629B-3BB5-156C-2752-D8F66DA49011}"/>
+              </a:ext>
+            </a:extLst>
+          </p:cNvPr>
+          <p:cNvSpPr/>
+          <p:nvPr/>
+        </p:nvSpPr>
+        <p:spPr>
+          <a:xfrm>
+            <a:off x="196305" y="2108225"/>
+            <a:ext cx="3951514" cy="3554148"/>
+          </a:xfrm>
+          <a:prstGeom prst="rect">
+            <a:avLst/>
+          </a:prstGeom>
+        </p:spPr>
+        <p:style>
+          <a:lnRef idx="2">
+            <a:schemeClr val="dk1"/>
+          </a:lnRef>
+          <a:fillRef idx="1">
+            <a:schemeClr val="lt1"/>
+          </a:fillRef>
+          <a:effectRef idx="0">
+            <a:schemeClr val="dk1"/>
+          </a:effectRef>
+          <a:fontRef idx="minor">
+            <a:schemeClr val="dk1"/>
+          </a:fontRef>
+        </p:style>
+        <p:txBody>
+          <a:bodyPr rtlCol="0" anchor="ctr"/>
+          <a:lstStyle/>
+          <a:p>
+            <a:pPr algn="ctr"/>
+            <a:endParaRPr lang="en-US" dirty="0"/>
+          </a:p>
+        </p:txBody>
+      </p:sp>
+      <p:sp>
+        <p:nvSpPr>
           <p:cNvPr id="5" name="Rectangle 4">
             <a:extLst>
               <a:ext uri="{FF2B5EF4-FFF2-40B4-BE49-F238E27FC236}">
@@ -3420,12 +3464,48 @@
           </a:p>
         </p:txBody>
       </p:sp>
-      <p:sp>
-        <p:nvSpPr>
-          <p:cNvPr id="6" name="Rectangle: Rounded Corners 5">
-            <a:extLst>
-              <a:ext uri="{FF2B5EF4-FFF2-40B4-BE49-F238E27FC236}">
-                <a16:creationId xmlns:a16="http://schemas.microsoft.com/office/drawing/2014/main" id="{7403D168-CD38-4014-AE7E-1CDD96EDF793}"/>
+      <p:pic>
+        <p:nvPicPr>
+          <p:cNvPr id="11" name="Graphic 10" descr="Tic Tac Toe outline">
+            <a:extLst>
+              <a:ext uri="{FF2B5EF4-FFF2-40B4-BE49-F238E27FC236}">
+                <a16:creationId xmlns:a16="http://schemas.microsoft.com/office/drawing/2014/main" id="{D8FFDC22-9132-A2FA-E38E-14D22EC971C7}"/>
+              </a:ext>
+            </a:extLst>
+          </p:cNvPr>
+          <p:cNvPicPr>
+            <a:picLocks noChangeAspect="1"/>
+          </p:cNvPicPr>
+          <p:nvPr/>
+        </p:nvPicPr>
+        <p:blipFill>
+          <a:blip r:embed="rId2">
+            <a:extLst>
+              <a:ext uri="{96DAC541-7B7A-43D3-8B79-37D633B846F1}">
+                <asvg:svgBlip xmlns:asvg="http://schemas.microsoft.com/office/drawing/2016/SVG/main" r:embed="rId3"/>
+              </a:ext>
+            </a:extLst>
+          </a:blip>
+          <a:stretch>
+            <a:fillRect/>
+          </a:stretch>
+        </p:blipFill>
+        <p:spPr>
+          <a:xfrm>
+            <a:off x="293914" y="402772"/>
+            <a:ext cx="664028" cy="664028"/>
+          </a:xfrm>
+          <a:prstGeom prst="rect">
+            <a:avLst/>
+          </a:prstGeom>
+        </p:spPr>
+      </p:pic>
+      <p:sp>
+        <p:nvSpPr>
+          <p:cNvPr id="13" name="Rectangle: Rounded Corners 12">
+            <a:extLst>
+              <a:ext uri="{FF2B5EF4-FFF2-40B4-BE49-F238E27FC236}">
+                <a16:creationId xmlns:a16="http://schemas.microsoft.com/office/drawing/2014/main" id="{3A876A20-29A4-9991-6AC5-5850BE826FB2}"/>
               </a:ext>
             </a:extLst>
           </p:cNvPr>
@@ -3434,10 +3514,191 @@
         </p:nvSpPr>
         <p:spPr>
           <a:xfrm>
-            <a:off x="1262742" y="2867798"/>
-            <a:ext cx="1817915" cy="152400"/>
+            <a:off x="1404257" y="3286311"/>
+            <a:ext cx="1545772" cy="299944"/>
           </a:xfrm>
           <a:prstGeom prst="roundRect">
+            <a:avLst/>
+          </a:prstGeom>
+        </p:spPr>
+        <p:style>
+          <a:lnRef idx="1">
+            <a:schemeClr val="accent2"/>
+          </a:lnRef>
+          <a:fillRef idx="3">
+            <a:schemeClr val="accent2"/>
+          </a:fillRef>
+          <a:effectRef idx="2">
+            <a:schemeClr val="accent2"/>
+          </a:effectRef>
+          <a:fontRef idx="minor">
+            <a:schemeClr val="lt1"/>
+          </a:fontRef>
+        </p:style>
+        <p:txBody>
+          <a:bodyPr rtlCol="0" anchor="ctr"/>
+          <a:lstStyle/>
+          <a:p>
+            <a:pPr algn="ctr"/>
+            <a:r>
+              <a:rPr lang="en-US" dirty="0"/>
+              <a:t>Single</a:t>
+            </a:r>
+          </a:p>
+        </p:txBody>
+      </p:sp>
+      <p:sp>
+        <p:nvSpPr>
+          <p:cNvPr id="14" name="Rectangle: Rounded Corners 13">
+            <a:extLst>
+              <a:ext uri="{FF2B5EF4-FFF2-40B4-BE49-F238E27FC236}">
+                <a16:creationId xmlns:a16="http://schemas.microsoft.com/office/drawing/2014/main" id="{531C77D3-7944-6ABD-C24C-449C3DA4C191}"/>
+              </a:ext>
+            </a:extLst>
+          </p:cNvPr>
+          <p:cNvSpPr/>
+          <p:nvPr/>
+        </p:nvSpPr>
+        <p:spPr>
+          <a:xfrm>
+            <a:off x="1410063" y="4353111"/>
+            <a:ext cx="1545772" cy="299944"/>
+          </a:xfrm>
+          <a:prstGeom prst="roundRect">
+            <a:avLst/>
+          </a:prstGeom>
+        </p:spPr>
+        <p:style>
+          <a:lnRef idx="1">
+            <a:schemeClr val="accent2"/>
+          </a:lnRef>
+          <a:fillRef idx="3">
+            <a:schemeClr val="accent2"/>
+          </a:fillRef>
+          <a:effectRef idx="2">
+            <a:schemeClr val="accent2"/>
+          </a:effectRef>
+          <a:fontRef idx="minor">
+            <a:schemeClr val="lt1"/>
+          </a:fontRef>
+        </p:style>
+        <p:txBody>
+          <a:bodyPr rtlCol="0" anchor="ctr"/>
+          <a:lstStyle/>
+          <a:p>
+            <a:pPr algn="ctr"/>
+            <a:r>
+              <a:rPr lang="en-US" sz="1600" dirty="0"/>
+              <a:t>Multiplayer</a:t>
+            </a:r>
+          </a:p>
+        </p:txBody>
+      </p:sp>
+      <p:sp>
+        <p:nvSpPr>
+          <p:cNvPr id="15" name="TextBox 14">
+            <a:extLst>
+              <a:ext uri="{FF2B5EF4-FFF2-40B4-BE49-F238E27FC236}">
+                <a16:creationId xmlns:a16="http://schemas.microsoft.com/office/drawing/2014/main" id="{5EBE536A-F1A1-4B0B-24F8-C171A80487AD}"/>
+              </a:ext>
+            </a:extLst>
+          </p:cNvPr>
+          <p:cNvSpPr txBox="1"/>
+          <p:nvPr/>
+        </p:nvSpPr>
+        <p:spPr>
+          <a:xfrm>
+            <a:off x="1747156" y="3831183"/>
+            <a:ext cx="871586" cy="276999"/>
+          </a:xfrm>
+          <a:prstGeom prst="rect">
+            <a:avLst/>
+          </a:prstGeom>
+          <a:noFill/>
+        </p:spPr>
+        <p:txBody>
+          <a:bodyPr wrap="square" rtlCol="0">
+            <a:spAutoFit/>
+          </a:bodyPr>
+          <a:lstStyle/>
+          <a:p>
+            <a:pPr algn="ctr"/>
+            <a:r>
+              <a:rPr lang="en-US" sz="1200" dirty="0"/>
+              <a:t>OR</a:t>
+            </a:r>
+          </a:p>
+        </p:txBody>
+      </p:sp>
+      <p:sp>
+        <p:nvSpPr>
+          <p:cNvPr id="17" name="Rectangle: Rounded Corners 16">
+            <a:extLst>
+              <a:ext uri="{FF2B5EF4-FFF2-40B4-BE49-F238E27FC236}">
+                <a16:creationId xmlns:a16="http://schemas.microsoft.com/office/drawing/2014/main" id="{A5D5053E-F842-60E3-AB55-CCC7533A98D6}"/>
+              </a:ext>
+            </a:extLst>
+          </p:cNvPr>
+          <p:cNvSpPr/>
+          <p:nvPr/>
+        </p:nvSpPr>
+        <p:spPr>
+          <a:xfrm>
+            <a:off x="1410062" y="5835996"/>
+            <a:ext cx="1545772" cy="299944"/>
+          </a:xfrm>
+          <a:prstGeom prst="roundRect">
+            <a:avLst/>
+          </a:prstGeom>
+        </p:spPr>
+        <p:style>
+          <a:lnRef idx="2">
+            <a:schemeClr val="accent2"/>
+          </a:lnRef>
+          <a:fillRef idx="1">
+            <a:schemeClr val="lt1"/>
+          </a:fillRef>
+          <a:effectRef idx="0">
+            <a:schemeClr val="accent2"/>
+          </a:effectRef>
+          <a:fontRef idx="minor">
+            <a:schemeClr val="dk1"/>
+          </a:fontRef>
+        </p:style>
+        <p:txBody>
+          <a:bodyPr rtlCol="0" anchor="ctr"/>
+          <a:lstStyle/>
+          <a:p>
+            <a:pPr algn="ctr"/>
+            <a:r>
+              <a:rPr lang="en-US" sz="1600" dirty="0">
+                <a:solidFill>
+                  <a:schemeClr val="tx1"/>
+                </a:solidFill>
+              </a:rPr>
+              <a:t>Records</a:t>
+            </a:r>
+          </a:p>
+        </p:txBody>
+      </p:sp>
+      <p:sp>
+        <p:nvSpPr>
+          <p:cNvPr id="18" name="Rectangle 17">
+            <a:extLst>
+              <a:ext uri="{FF2B5EF4-FFF2-40B4-BE49-F238E27FC236}">
+                <a16:creationId xmlns:a16="http://schemas.microsoft.com/office/drawing/2014/main" id="{E99E26D2-2931-DDB9-812B-B7F2A39C3961}"/>
+              </a:ext>
+            </a:extLst>
+          </p:cNvPr>
+          <p:cNvSpPr/>
+          <p:nvPr/>
+        </p:nvSpPr>
+        <p:spPr>
+          <a:xfrm>
+            <a:off x="4495435" y="310243"/>
+            <a:ext cx="3951514" cy="6237514"/>
+          </a:xfrm>
+          <a:prstGeom prst="rect">
             <a:avLst/>
           </a:prstGeom>
         </p:spPr>
@@ -3460,16 +3721,16 @@
           <a:lstStyle/>
           <a:p>
             <a:pPr algn="ctr"/>
-            <a:endParaRPr lang="en-US"/>
-          </a:p>
-        </p:txBody>
-      </p:sp>
-      <p:sp>
-        <p:nvSpPr>
-          <p:cNvPr id="7" name="Oval 6">
-            <a:extLst>
-              <a:ext uri="{FF2B5EF4-FFF2-40B4-BE49-F238E27FC236}">
-                <a16:creationId xmlns:a16="http://schemas.microsoft.com/office/drawing/2014/main" id="{3F44968D-E1DD-E54D-890C-2241793AB401}"/>
+            <a:endParaRPr lang="en-US" dirty="0"/>
+          </a:p>
+        </p:txBody>
+      </p:sp>
+      <p:sp>
+        <p:nvSpPr>
+          <p:cNvPr id="19" name="Rectangle 18">
+            <a:extLst>
+              <a:ext uri="{FF2B5EF4-FFF2-40B4-BE49-F238E27FC236}">
+                <a16:creationId xmlns:a16="http://schemas.microsoft.com/office/drawing/2014/main" id="{9104525A-3EDD-3021-7A3F-856EA7687BD6}"/>
               </a:ext>
             </a:extLst>
           </p:cNvPr>
@@ -3478,7 +3739,629 @@
         </p:nvSpPr>
         <p:spPr>
           <a:xfrm>
-            <a:off x="2112191" y="2853602"/>
+            <a:off x="4495435" y="310243"/>
+            <a:ext cx="3951514" cy="903514"/>
+          </a:xfrm>
+          <a:prstGeom prst="rect">
+            <a:avLst/>
+          </a:prstGeom>
+        </p:spPr>
+        <p:style>
+          <a:lnRef idx="2">
+            <a:schemeClr val="accent6"/>
+          </a:lnRef>
+          <a:fillRef idx="1">
+            <a:schemeClr val="lt1"/>
+          </a:fillRef>
+          <a:effectRef idx="0">
+            <a:schemeClr val="accent6"/>
+          </a:effectRef>
+          <a:fontRef idx="minor">
+            <a:schemeClr val="dk1"/>
+          </a:fontRef>
+        </p:style>
+        <p:txBody>
+          <a:bodyPr rtlCol="0" anchor="ctr"/>
+          <a:lstStyle/>
+          <a:p>
+            <a:pPr algn="ctr"/>
+            <a:r>
+              <a:rPr lang="en-US" b="1" u="sng" dirty="0"/>
+              <a:t>X</a:t>
+            </a:r>
+            <a:r>
+              <a:rPr lang="en-US" dirty="0"/>
+              <a:t> </a:t>
+            </a:r>
+            <a:r>
+              <a:rPr lang="en-US" i="1" dirty="0"/>
+              <a:t>Marks the Spot</a:t>
+            </a:r>
+          </a:p>
+        </p:txBody>
+      </p:sp>
+      <p:pic>
+        <p:nvPicPr>
+          <p:cNvPr id="23" name="Graphic 22" descr="Tic Tac Toe outline">
+            <a:extLst>
+              <a:ext uri="{FF2B5EF4-FFF2-40B4-BE49-F238E27FC236}">
+                <a16:creationId xmlns:a16="http://schemas.microsoft.com/office/drawing/2014/main" id="{782717BF-0616-ED3B-930B-A336283F5709}"/>
+              </a:ext>
+            </a:extLst>
+          </p:cNvPr>
+          <p:cNvPicPr>
+            <a:picLocks noChangeAspect="1"/>
+          </p:cNvPicPr>
+          <p:nvPr/>
+        </p:nvPicPr>
+        <p:blipFill>
+          <a:blip r:embed="rId2">
+            <a:extLst>
+              <a:ext uri="{96DAC541-7B7A-43D3-8B79-37D633B846F1}">
+                <asvg:svgBlip xmlns:asvg="http://schemas.microsoft.com/office/drawing/2016/SVG/main" r:embed="rId3"/>
+              </a:ext>
+            </a:extLst>
+          </a:blip>
+          <a:stretch>
+            <a:fillRect/>
+          </a:stretch>
+        </p:blipFill>
+        <p:spPr>
+          <a:xfrm>
+            <a:off x="4593406" y="429986"/>
+            <a:ext cx="664028" cy="664028"/>
+          </a:xfrm>
+          <a:prstGeom prst="rect">
+            <a:avLst/>
+          </a:prstGeom>
+        </p:spPr>
+      </p:pic>
+      <p:sp>
+        <p:nvSpPr>
+          <p:cNvPr id="28" name="Rectangle 27">
+            <a:extLst>
+              <a:ext uri="{FF2B5EF4-FFF2-40B4-BE49-F238E27FC236}">
+                <a16:creationId xmlns:a16="http://schemas.microsoft.com/office/drawing/2014/main" id="{E0819C01-2586-0EC4-3B76-9E13E12EE2F1}"/>
+              </a:ext>
+            </a:extLst>
+          </p:cNvPr>
+          <p:cNvSpPr/>
+          <p:nvPr/>
+        </p:nvSpPr>
+        <p:spPr>
+          <a:xfrm>
+            <a:off x="4866277" y="2445388"/>
+            <a:ext cx="1066799" cy="827314"/>
+          </a:xfrm>
+          <a:prstGeom prst="rect">
+            <a:avLst/>
+          </a:prstGeom>
+        </p:spPr>
+        <p:style>
+          <a:lnRef idx="2">
+            <a:schemeClr val="accent6"/>
+          </a:lnRef>
+          <a:fillRef idx="1">
+            <a:schemeClr val="lt1"/>
+          </a:fillRef>
+          <a:effectRef idx="0">
+            <a:schemeClr val="accent6"/>
+          </a:effectRef>
+          <a:fontRef idx="minor">
+            <a:schemeClr val="dk1"/>
+          </a:fontRef>
+        </p:style>
+        <p:txBody>
+          <a:bodyPr rtlCol="0" anchor="ctr"/>
+          <a:lstStyle/>
+          <a:p>
+            <a:pPr algn="ctr"/>
+            <a:endParaRPr lang="en-US"/>
+          </a:p>
+        </p:txBody>
+      </p:sp>
+      <p:sp>
+        <p:nvSpPr>
+          <p:cNvPr id="29" name="Rectangle 28">
+            <a:extLst>
+              <a:ext uri="{FF2B5EF4-FFF2-40B4-BE49-F238E27FC236}">
+                <a16:creationId xmlns:a16="http://schemas.microsoft.com/office/drawing/2014/main" id="{8FE791BD-3BA7-C2EE-58BC-48A996DADFD1}"/>
+              </a:ext>
+            </a:extLst>
+          </p:cNvPr>
+          <p:cNvSpPr/>
+          <p:nvPr/>
+        </p:nvSpPr>
+        <p:spPr>
+          <a:xfrm>
+            <a:off x="5933073" y="2445388"/>
+            <a:ext cx="1066799" cy="827314"/>
+          </a:xfrm>
+          <a:prstGeom prst="rect">
+            <a:avLst/>
+          </a:prstGeom>
+        </p:spPr>
+        <p:style>
+          <a:lnRef idx="2">
+            <a:schemeClr val="accent6"/>
+          </a:lnRef>
+          <a:fillRef idx="1">
+            <a:schemeClr val="lt1"/>
+          </a:fillRef>
+          <a:effectRef idx="0">
+            <a:schemeClr val="accent6"/>
+          </a:effectRef>
+          <a:fontRef idx="minor">
+            <a:schemeClr val="dk1"/>
+          </a:fontRef>
+        </p:style>
+        <p:txBody>
+          <a:bodyPr rtlCol="0" anchor="ctr"/>
+          <a:lstStyle/>
+          <a:p>
+            <a:pPr algn="ctr"/>
+            <a:endParaRPr lang="en-US"/>
+          </a:p>
+        </p:txBody>
+      </p:sp>
+      <p:sp>
+        <p:nvSpPr>
+          <p:cNvPr id="30" name="Rectangle 29">
+            <a:extLst>
+              <a:ext uri="{FF2B5EF4-FFF2-40B4-BE49-F238E27FC236}">
+                <a16:creationId xmlns:a16="http://schemas.microsoft.com/office/drawing/2014/main" id="{5A116305-A828-B84E-4925-1843E5A9B166}"/>
+              </a:ext>
+            </a:extLst>
+          </p:cNvPr>
+          <p:cNvSpPr/>
+          <p:nvPr/>
+        </p:nvSpPr>
+        <p:spPr>
+          <a:xfrm>
+            <a:off x="6999869" y="2445388"/>
+            <a:ext cx="1066799" cy="827314"/>
+          </a:xfrm>
+          <a:prstGeom prst="rect">
+            <a:avLst/>
+          </a:prstGeom>
+        </p:spPr>
+        <p:style>
+          <a:lnRef idx="2">
+            <a:schemeClr val="accent6"/>
+          </a:lnRef>
+          <a:fillRef idx="1">
+            <a:schemeClr val="lt1"/>
+          </a:fillRef>
+          <a:effectRef idx="0">
+            <a:schemeClr val="accent6"/>
+          </a:effectRef>
+          <a:fontRef idx="minor">
+            <a:schemeClr val="dk1"/>
+          </a:fontRef>
+        </p:style>
+        <p:txBody>
+          <a:bodyPr rtlCol="0" anchor="ctr"/>
+          <a:lstStyle/>
+          <a:p>
+            <a:pPr algn="ctr"/>
+            <a:endParaRPr lang="en-US"/>
+          </a:p>
+        </p:txBody>
+      </p:sp>
+      <p:sp>
+        <p:nvSpPr>
+          <p:cNvPr id="31" name="Rectangle 30">
+            <a:extLst>
+              <a:ext uri="{FF2B5EF4-FFF2-40B4-BE49-F238E27FC236}">
+                <a16:creationId xmlns:a16="http://schemas.microsoft.com/office/drawing/2014/main" id="{AAC298B6-3437-9208-51D5-0DD26F7DB354}"/>
+              </a:ext>
+            </a:extLst>
+          </p:cNvPr>
+          <p:cNvSpPr/>
+          <p:nvPr/>
+        </p:nvSpPr>
+        <p:spPr>
+          <a:xfrm>
+            <a:off x="4866277" y="3280868"/>
+            <a:ext cx="1066799" cy="827314"/>
+          </a:xfrm>
+          <a:prstGeom prst="rect">
+            <a:avLst/>
+          </a:prstGeom>
+        </p:spPr>
+        <p:style>
+          <a:lnRef idx="2">
+            <a:schemeClr val="accent6"/>
+          </a:lnRef>
+          <a:fillRef idx="1">
+            <a:schemeClr val="lt1"/>
+          </a:fillRef>
+          <a:effectRef idx="0">
+            <a:schemeClr val="accent6"/>
+          </a:effectRef>
+          <a:fontRef idx="minor">
+            <a:schemeClr val="dk1"/>
+          </a:fontRef>
+        </p:style>
+        <p:txBody>
+          <a:bodyPr rtlCol="0" anchor="ctr"/>
+          <a:lstStyle/>
+          <a:p>
+            <a:pPr algn="ctr"/>
+            <a:endParaRPr lang="en-US"/>
+          </a:p>
+        </p:txBody>
+      </p:sp>
+      <p:sp>
+        <p:nvSpPr>
+          <p:cNvPr id="32" name="Rectangle 31">
+            <a:extLst>
+              <a:ext uri="{FF2B5EF4-FFF2-40B4-BE49-F238E27FC236}">
+                <a16:creationId xmlns:a16="http://schemas.microsoft.com/office/drawing/2014/main" id="{CE62797F-0181-8430-75B0-25355B8CCA85}"/>
+              </a:ext>
+            </a:extLst>
+          </p:cNvPr>
+          <p:cNvSpPr/>
+          <p:nvPr/>
+        </p:nvSpPr>
+        <p:spPr>
+          <a:xfrm>
+            <a:off x="5933073" y="3280868"/>
+            <a:ext cx="1066799" cy="827314"/>
+          </a:xfrm>
+          <a:prstGeom prst="rect">
+            <a:avLst/>
+          </a:prstGeom>
+        </p:spPr>
+        <p:style>
+          <a:lnRef idx="2">
+            <a:schemeClr val="accent6"/>
+          </a:lnRef>
+          <a:fillRef idx="1">
+            <a:schemeClr val="lt1"/>
+          </a:fillRef>
+          <a:effectRef idx="0">
+            <a:schemeClr val="accent6"/>
+          </a:effectRef>
+          <a:fontRef idx="minor">
+            <a:schemeClr val="dk1"/>
+          </a:fontRef>
+        </p:style>
+        <p:txBody>
+          <a:bodyPr rtlCol="0" anchor="ctr"/>
+          <a:lstStyle/>
+          <a:p>
+            <a:pPr algn="ctr"/>
+            <a:endParaRPr lang="en-US"/>
+          </a:p>
+        </p:txBody>
+      </p:sp>
+      <p:sp>
+        <p:nvSpPr>
+          <p:cNvPr id="33" name="Rectangle 32">
+            <a:extLst>
+              <a:ext uri="{FF2B5EF4-FFF2-40B4-BE49-F238E27FC236}">
+                <a16:creationId xmlns:a16="http://schemas.microsoft.com/office/drawing/2014/main" id="{99D9AE0C-E2C7-3838-3F3A-BF904E2227AD}"/>
+              </a:ext>
+            </a:extLst>
+          </p:cNvPr>
+          <p:cNvSpPr/>
+          <p:nvPr/>
+        </p:nvSpPr>
+        <p:spPr>
+          <a:xfrm>
+            <a:off x="6999869" y="3280868"/>
+            <a:ext cx="1066799" cy="827314"/>
+          </a:xfrm>
+          <a:prstGeom prst="rect">
+            <a:avLst/>
+          </a:prstGeom>
+        </p:spPr>
+        <p:style>
+          <a:lnRef idx="2">
+            <a:schemeClr val="accent6"/>
+          </a:lnRef>
+          <a:fillRef idx="1">
+            <a:schemeClr val="lt1"/>
+          </a:fillRef>
+          <a:effectRef idx="0">
+            <a:schemeClr val="accent6"/>
+          </a:effectRef>
+          <a:fontRef idx="minor">
+            <a:schemeClr val="dk1"/>
+          </a:fontRef>
+        </p:style>
+        <p:txBody>
+          <a:bodyPr rtlCol="0" anchor="ctr"/>
+          <a:lstStyle/>
+          <a:p>
+            <a:pPr algn="ctr"/>
+            <a:endParaRPr lang="en-US"/>
+          </a:p>
+        </p:txBody>
+      </p:sp>
+      <p:sp>
+        <p:nvSpPr>
+          <p:cNvPr id="34" name="Rectangle 33">
+            <a:extLst>
+              <a:ext uri="{FF2B5EF4-FFF2-40B4-BE49-F238E27FC236}">
+                <a16:creationId xmlns:a16="http://schemas.microsoft.com/office/drawing/2014/main" id="{FAA6E11C-680D-2B29-913C-E35813B8B608}"/>
+              </a:ext>
+            </a:extLst>
+          </p:cNvPr>
+          <p:cNvSpPr/>
+          <p:nvPr/>
+        </p:nvSpPr>
+        <p:spPr>
+          <a:xfrm>
+            <a:off x="4866277" y="4108182"/>
+            <a:ext cx="1066799" cy="827314"/>
+          </a:xfrm>
+          <a:prstGeom prst="rect">
+            <a:avLst/>
+          </a:prstGeom>
+        </p:spPr>
+        <p:style>
+          <a:lnRef idx="2">
+            <a:schemeClr val="accent6"/>
+          </a:lnRef>
+          <a:fillRef idx="1">
+            <a:schemeClr val="lt1"/>
+          </a:fillRef>
+          <a:effectRef idx="0">
+            <a:schemeClr val="accent6"/>
+          </a:effectRef>
+          <a:fontRef idx="minor">
+            <a:schemeClr val="dk1"/>
+          </a:fontRef>
+        </p:style>
+        <p:txBody>
+          <a:bodyPr rtlCol="0" anchor="ctr"/>
+          <a:lstStyle/>
+          <a:p>
+            <a:pPr algn="ctr"/>
+            <a:endParaRPr lang="en-US"/>
+          </a:p>
+        </p:txBody>
+      </p:sp>
+      <p:sp>
+        <p:nvSpPr>
+          <p:cNvPr id="35" name="Rectangle 34">
+            <a:extLst>
+              <a:ext uri="{FF2B5EF4-FFF2-40B4-BE49-F238E27FC236}">
+                <a16:creationId xmlns:a16="http://schemas.microsoft.com/office/drawing/2014/main" id="{E4A7D28C-1146-333A-48A4-7F7025385B67}"/>
+              </a:ext>
+            </a:extLst>
+          </p:cNvPr>
+          <p:cNvSpPr/>
+          <p:nvPr/>
+        </p:nvSpPr>
+        <p:spPr>
+          <a:xfrm>
+            <a:off x="5933073" y="4108182"/>
+            <a:ext cx="1066799" cy="827314"/>
+          </a:xfrm>
+          <a:prstGeom prst="rect">
+            <a:avLst/>
+          </a:prstGeom>
+        </p:spPr>
+        <p:style>
+          <a:lnRef idx="2">
+            <a:schemeClr val="accent6"/>
+          </a:lnRef>
+          <a:fillRef idx="1">
+            <a:schemeClr val="lt1"/>
+          </a:fillRef>
+          <a:effectRef idx="0">
+            <a:schemeClr val="accent6"/>
+          </a:effectRef>
+          <a:fontRef idx="minor">
+            <a:schemeClr val="dk1"/>
+          </a:fontRef>
+        </p:style>
+        <p:txBody>
+          <a:bodyPr rtlCol="0" anchor="ctr"/>
+          <a:lstStyle/>
+          <a:p>
+            <a:pPr algn="ctr"/>
+            <a:endParaRPr lang="en-US"/>
+          </a:p>
+        </p:txBody>
+      </p:sp>
+      <p:sp>
+        <p:nvSpPr>
+          <p:cNvPr id="36" name="Rectangle 35">
+            <a:extLst>
+              <a:ext uri="{FF2B5EF4-FFF2-40B4-BE49-F238E27FC236}">
+                <a16:creationId xmlns:a16="http://schemas.microsoft.com/office/drawing/2014/main" id="{B7D9BE0B-10C1-5CD6-C2E7-BC2E961DE9C0}"/>
+              </a:ext>
+            </a:extLst>
+          </p:cNvPr>
+          <p:cNvSpPr/>
+          <p:nvPr/>
+        </p:nvSpPr>
+        <p:spPr>
+          <a:xfrm>
+            <a:off x="6999869" y="4108182"/>
+            <a:ext cx="1066799" cy="827314"/>
+          </a:xfrm>
+          <a:prstGeom prst="rect">
+            <a:avLst/>
+          </a:prstGeom>
+        </p:spPr>
+        <p:style>
+          <a:lnRef idx="2">
+            <a:schemeClr val="accent6"/>
+          </a:lnRef>
+          <a:fillRef idx="1">
+            <a:schemeClr val="lt1"/>
+          </a:fillRef>
+          <a:effectRef idx="0">
+            <a:schemeClr val="accent6"/>
+          </a:effectRef>
+          <a:fontRef idx="minor">
+            <a:schemeClr val="dk1"/>
+          </a:fontRef>
+        </p:style>
+        <p:txBody>
+          <a:bodyPr rtlCol="0" anchor="ctr"/>
+          <a:lstStyle/>
+          <a:p>
+            <a:pPr algn="ctr"/>
+            <a:endParaRPr lang="en-US"/>
+          </a:p>
+        </p:txBody>
+      </p:sp>
+      <p:sp>
+        <p:nvSpPr>
+          <p:cNvPr id="39" name="Rectangle 38">
+            <a:extLst>
+              <a:ext uri="{FF2B5EF4-FFF2-40B4-BE49-F238E27FC236}">
+                <a16:creationId xmlns:a16="http://schemas.microsoft.com/office/drawing/2014/main" id="{6EB5DB87-FF27-EB27-C289-333827EB025E}"/>
+              </a:ext>
+            </a:extLst>
+          </p:cNvPr>
+          <p:cNvSpPr/>
+          <p:nvPr/>
+        </p:nvSpPr>
+        <p:spPr>
+          <a:xfrm>
+            <a:off x="195943" y="1195627"/>
+            <a:ext cx="3951514" cy="903514"/>
+          </a:xfrm>
+          <a:prstGeom prst="rect">
+            <a:avLst/>
+          </a:prstGeom>
+        </p:spPr>
+        <p:style>
+          <a:lnRef idx="2">
+            <a:schemeClr val="dk1"/>
+          </a:lnRef>
+          <a:fillRef idx="1">
+            <a:schemeClr val="lt1"/>
+          </a:fillRef>
+          <a:effectRef idx="0">
+            <a:schemeClr val="dk1"/>
+          </a:effectRef>
+          <a:fontRef idx="minor">
+            <a:schemeClr val="dk1"/>
+          </a:fontRef>
+        </p:style>
+        <p:txBody>
+          <a:bodyPr rtlCol="0" anchor="ctr"/>
+          <a:lstStyle/>
+          <a:p>
+            <a:pPr algn="ctr"/>
+            <a:r>
+              <a:rPr lang="en-US" b="1" dirty="0"/>
+              <a:t>Ready for a challenge?</a:t>
+            </a:r>
+          </a:p>
+        </p:txBody>
+      </p:sp>
+      <p:sp>
+        <p:nvSpPr>
+          <p:cNvPr id="41" name="Rectangle 40">
+            <a:extLst>
+              <a:ext uri="{FF2B5EF4-FFF2-40B4-BE49-F238E27FC236}">
+                <a16:creationId xmlns:a16="http://schemas.microsoft.com/office/drawing/2014/main" id="{98DB6C37-6481-C428-1C95-46F16AE741D5}"/>
+              </a:ext>
+            </a:extLst>
+          </p:cNvPr>
+          <p:cNvSpPr/>
+          <p:nvPr/>
+        </p:nvSpPr>
+        <p:spPr>
+          <a:xfrm>
+            <a:off x="195581" y="2111546"/>
+            <a:ext cx="3951514" cy="658830"/>
+          </a:xfrm>
+          <a:prstGeom prst="rect">
+            <a:avLst/>
+          </a:prstGeom>
+        </p:spPr>
+        <p:style>
+          <a:lnRef idx="2">
+            <a:schemeClr val="dk1"/>
+          </a:lnRef>
+          <a:fillRef idx="1">
+            <a:schemeClr val="lt1"/>
+          </a:fillRef>
+          <a:effectRef idx="0">
+            <a:schemeClr val="dk1"/>
+          </a:effectRef>
+          <a:fontRef idx="minor">
+            <a:schemeClr val="dk1"/>
+          </a:fontRef>
+        </p:style>
+        <p:txBody>
+          <a:bodyPr rtlCol="0" anchor="ctr"/>
+          <a:lstStyle/>
+          <a:p>
+            <a:pPr algn="ctr"/>
+            <a:endParaRPr lang="en-US" b="1" dirty="0"/>
+          </a:p>
+        </p:txBody>
+      </p:sp>
+      <p:sp>
+        <p:nvSpPr>
+          <p:cNvPr id="6" name="Rectangle: Rounded Corners 5">
+            <a:extLst>
+              <a:ext uri="{FF2B5EF4-FFF2-40B4-BE49-F238E27FC236}">
+                <a16:creationId xmlns:a16="http://schemas.microsoft.com/office/drawing/2014/main" id="{7403D168-CD38-4014-AE7E-1CDD96EDF793}"/>
+              </a:ext>
+            </a:extLst>
+          </p:cNvPr>
+          <p:cNvSpPr/>
+          <p:nvPr/>
+        </p:nvSpPr>
+        <p:spPr>
+          <a:xfrm>
+            <a:off x="1235165" y="2349642"/>
+            <a:ext cx="1817915" cy="152400"/>
+          </a:xfrm>
+          <a:prstGeom prst="roundRect">
+            <a:avLst/>
+          </a:prstGeom>
+        </p:spPr>
+        <p:style>
+          <a:lnRef idx="2">
+            <a:schemeClr val="accent6"/>
+          </a:lnRef>
+          <a:fillRef idx="1">
+            <a:schemeClr val="lt1"/>
+          </a:fillRef>
+          <a:effectRef idx="0">
+            <a:schemeClr val="accent6"/>
+          </a:effectRef>
+          <a:fontRef idx="minor">
+            <a:schemeClr val="dk1"/>
+          </a:fontRef>
+        </p:style>
+        <p:txBody>
+          <a:bodyPr rtlCol="0" anchor="ctr"/>
+          <a:lstStyle/>
+          <a:p>
+            <a:pPr algn="ctr"/>
+            <a:endParaRPr lang="en-US"/>
+          </a:p>
+        </p:txBody>
+      </p:sp>
+      <p:sp>
+        <p:nvSpPr>
+          <p:cNvPr id="7" name="Oval 6">
+            <a:extLst>
+              <a:ext uri="{FF2B5EF4-FFF2-40B4-BE49-F238E27FC236}">
+                <a16:creationId xmlns:a16="http://schemas.microsoft.com/office/drawing/2014/main" id="{3F44968D-E1DD-E54D-890C-2241793AB401}"/>
+              </a:ext>
+            </a:extLst>
+          </p:cNvPr>
+          <p:cNvSpPr/>
+          <p:nvPr/>
+        </p:nvSpPr>
+        <p:spPr>
+          <a:xfrm>
+            <a:off x="2084614" y="2335446"/>
             <a:ext cx="141515" cy="152400"/>
           </a:xfrm>
           <a:prstGeom prst="ellipse">
@@ -3524,7 +4407,7 @@
         </p:nvSpPr>
         <p:spPr>
           <a:xfrm>
-            <a:off x="1806664" y="2943998"/>
+            <a:off x="1708329" y="2471811"/>
             <a:ext cx="871586" cy="276999"/>
           </a:xfrm>
           <a:prstGeom prst="rect">
@@ -3545,142 +4428,53 @@
           </a:p>
         </p:txBody>
       </p:sp>
-      <p:pic>
-        <p:nvPicPr>
-          <p:cNvPr id="11" name="Graphic 10" descr="Tic Tac Toe outline">
-            <a:extLst>
-              <a:ext uri="{FF2B5EF4-FFF2-40B4-BE49-F238E27FC236}">
-                <a16:creationId xmlns:a16="http://schemas.microsoft.com/office/drawing/2014/main" id="{D8FFDC22-9132-A2FA-E38E-14D22EC971C7}"/>
-              </a:ext>
-            </a:extLst>
-          </p:cNvPr>
-          <p:cNvPicPr>
-            <a:picLocks noChangeAspect="1"/>
-          </p:cNvPicPr>
+      <p:cxnSp>
+        <p:nvCxnSpPr>
+          <p:cNvPr id="44" name="Straight Arrow Connector 43">
+            <a:extLst>
+              <a:ext uri="{FF2B5EF4-FFF2-40B4-BE49-F238E27FC236}">
+                <a16:creationId xmlns:a16="http://schemas.microsoft.com/office/drawing/2014/main" id="{F4054B06-7440-62C1-505B-C1B2A4FAC987}"/>
+              </a:ext>
+            </a:extLst>
+          </p:cNvPr>
+          <p:cNvCxnSpPr>
+            <a:stCxn id="40" idx="3"/>
+          </p:cNvCxnSpPr>
           <p:nvPr/>
-        </p:nvPicPr>
-        <p:blipFill>
-          <a:blip r:embed="rId2">
-            <a:extLst>
-              <a:ext uri="{96DAC541-7B7A-43D3-8B79-37D633B846F1}">
-                <asvg:svgBlip xmlns:asvg="http://schemas.microsoft.com/office/drawing/2016/SVG/main" r:embed="rId3"/>
-              </a:ext>
-            </a:extLst>
-          </a:blip>
-          <a:stretch>
-            <a:fillRect/>
-          </a:stretch>
-        </p:blipFill>
-        <p:spPr>
-          <a:xfrm>
-            <a:off x="293914" y="402772"/>
-            <a:ext cx="664028" cy="664028"/>
-          </a:xfrm>
-          <a:prstGeom prst="rect">
+        </p:nvCxnSpPr>
+        <p:spPr>
+          <a:xfrm>
+            <a:off x="4147819" y="3885299"/>
+            <a:ext cx="141152" cy="2820301"/>
+          </a:xfrm>
+          <a:prstGeom prst="straightConnector1">
             <a:avLst/>
           </a:prstGeom>
-        </p:spPr>
-      </p:pic>
-      <p:sp>
-        <p:nvSpPr>
-          <p:cNvPr id="13" name="Rectangle: Rounded Corners 12">
-            <a:extLst>
-              <a:ext uri="{FF2B5EF4-FFF2-40B4-BE49-F238E27FC236}">
-                <a16:creationId xmlns:a16="http://schemas.microsoft.com/office/drawing/2014/main" id="{3A876A20-29A4-9991-6AC5-5850BE826FB2}"/>
-              </a:ext>
-            </a:extLst>
-          </p:cNvPr>
-          <p:cNvSpPr/>
-          <p:nvPr/>
-        </p:nvSpPr>
-        <p:spPr>
-          <a:xfrm>
-            <a:off x="1404257" y="3286311"/>
-            <a:ext cx="1545772" cy="299944"/>
-          </a:xfrm>
-          <a:prstGeom prst="roundRect">
-            <a:avLst/>
-          </a:prstGeom>
+          <a:ln>
+            <a:tailEnd type="triangle"/>
+          </a:ln>
         </p:spPr>
         <p:style>
-          <a:lnRef idx="1">
-            <a:schemeClr val="accent2"/>
+          <a:lnRef idx="2">
+            <a:schemeClr val="accent1"/>
           </a:lnRef>
-          <a:fillRef idx="3">
-            <a:schemeClr val="accent2"/>
+          <a:fillRef idx="0">
+            <a:schemeClr val="accent1"/>
           </a:fillRef>
-          <a:effectRef idx="2">
-            <a:schemeClr val="accent2"/>
+          <a:effectRef idx="1">
+            <a:schemeClr val="accent1"/>
           </a:effectRef>
           <a:fontRef idx="minor">
-            <a:schemeClr val="lt1"/>
+            <a:schemeClr val="tx1"/>
           </a:fontRef>
         </p:style>
-        <p:txBody>
-          <a:bodyPr rtlCol="0" anchor="ctr"/>
-          <a:lstStyle/>
-          <a:p>
-            <a:pPr algn="ctr"/>
-            <a:r>
-              <a:rPr lang="en-US" dirty="0"/>
-              <a:t>START</a:t>
-            </a:r>
-          </a:p>
-        </p:txBody>
-      </p:sp>
-      <p:sp>
-        <p:nvSpPr>
-          <p:cNvPr id="14" name="Rectangle: Rounded Corners 13">
-            <a:extLst>
-              <a:ext uri="{FF2B5EF4-FFF2-40B4-BE49-F238E27FC236}">
-                <a16:creationId xmlns:a16="http://schemas.microsoft.com/office/drawing/2014/main" id="{531C77D3-7944-6ABD-C24C-449C3DA4C191}"/>
-              </a:ext>
-            </a:extLst>
-          </p:cNvPr>
-          <p:cNvSpPr/>
-          <p:nvPr/>
-        </p:nvSpPr>
-        <p:spPr>
-          <a:xfrm>
-            <a:off x="1410063" y="4353111"/>
-            <a:ext cx="1545772" cy="299944"/>
-          </a:xfrm>
-          <a:prstGeom prst="roundRect">
-            <a:avLst/>
-          </a:prstGeom>
-        </p:spPr>
-        <p:style>
-          <a:lnRef idx="1">
-            <a:schemeClr val="accent2"/>
-          </a:lnRef>
-          <a:fillRef idx="3">
-            <a:schemeClr val="accent2"/>
-          </a:fillRef>
-          <a:effectRef idx="2">
-            <a:schemeClr val="accent2"/>
-          </a:effectRef>
-          <a:fontRef idx="minor">
-            <a:schemeClr val="lt1"/>
-          </a:fontRef>
-        </p:style>
-        <p:txBody>
-          <a:bodyPr rtlCol="0" anchor="ctr"/>
-          <a:lstStyle/>
-          <a:p>
-            <a:pPr algn="ctr"/>
-            <a:r>
-              <a:rPr lang="en-US" sz="1600" dirty="0"/>
-              <a:t>MULTIPLAYER</a:t>
-            </a:r>
-          </a:p>
-        </p:txBody>
-      </p:sp>
-      <p:sp>
-        <p:nvSpPr>
-          <p:cNvPr id="15" name="TextBox 14">
-            <a:extLst>
-              <a:ext uri="{FF2B5EF4-FFF2-40B4-BE49-F238E27FC236}">
-                <a16:creationId xmlns:a16="http://schemas.microsoft.com/office/drawing/2014/main" id="{5EBE536A-F1A1-4B0B-24F8-C171A80487AD}"/>
+      </p:cxnSp>
+      <p:sp>
+        <p:nvSpPr>
+          <p:cNvPr id="45" name="TextBox 44">
+            <a:extLst>
+              <a:ext uri="{FF2B5EF4-FFF2-40B4-BE49-F238E27FC236}">
+                <a16:creationId xmlns:a16="http://schemas.microsoft.com/office/drawing/2014/main" id="{374B6242-A645-2872-A240-180533B08C67}"/>
               </a:ext>
             </a:extLst>
           </p:cNvPr>
@@ -3689,8 +4483,8 @@
         </p:nvSpPr>
         <p:spPr>
           <a:xfrm>
-            <a:off x="1747156" y="3831183"/>
-            <a:ext cx="871586" cy="276999"/>
+            <a:off x="3972859" y="6640286"/>
+            <a:ext cx="632224" cy="369332"/>
           </a:xfrm>
           <a:prstGeom prst="rect">
             <a:avLst/>
@@ -3698,598 +4492,15 @@
           <a:noFill/>
         </p:spPr>
         <p:txBody>
-          <a:bodyPr wrap="square" rtlCol="0">
+          <a:bodyPr wrap="none" rtlCol="0">
             <a:spAutoFit/>
           </a:bodyPr>
           <a:lstStyle/>
           <a:p>
-            <a:pPr algn="ctr"/>
-            <a:r>
-              <a:rPr lang="en-US" sz="1200" dirty="0"/>
-              <a:t>OR</a:t>
-            </a:r>
-          </a:p>
-        </p:txBody>
-      </p:sp>
-      <p:sp>
-        <p:nvSpPr>
-          <p:cNvPr id="17" name="Rectangle: Rounded Corners 16">
-            <a:extLst>
-              <a:ext uri="{FF2B5EF4-FFF2-40B4-BE49-F238E27FC236}">
-                <a16:creationId xmlns:a16="http://schemas.microsoft.com/office/drawing/2014/main" id="{A5D5053E-F842-60E3-AB55-CCC7533A98D6}"/>
-              </a:ext>
-            </a:extLst>
-          </p:cNvPr>
-          <p:cNvSpPr/>
-          <p:nvPr/>
-        </p:nvSpPr>
-        <p:spPr>
-          <a:xfrm>
-            <a:off x="1410062" y="5835996"/>
-            <a:ext cx="1545772" cy="299944"/>
-          </a:xfrm>
-          <a:prstGeom prst="roundRect">
-            <a:avLst/>
-          </a:prstGeom>
-        </p:spPr>
-        <p:style>
-          <a:lnRef idx="2">
-            <a:schemeClr val="accent2"/>
-          </a:lnRef>
-          <a:fillRef idx="1">
-            <a:schemeClr val="lt1"/>
-          </a:fillRef>
-          <a:effectRef idx="0">
-            <a:schemeClr val="accent2"/>
-          </a:effectRef>
-          <a:fontRef idx="minor">
-            <a:schemeClr val="dk1"/>
-          </a:fontRef>
-        </p:style>
-        <p:txBody>
-          <a:bodyPr rtlCol="0" anchor="ctr"/>
-          <a:lstStyle/>
-          <a:p>
-            <a:pPr algn="ctr"/>
-            <a:r>
-              <a:rPr lang="en-US" sz="1600" dirty="0">
-                <a:solidFill>
-                  <a:schemeClr val="tx1"/>
-                </a:solidFill>
-              </a:rPr>
-              <a:t>RECORDS</a:t>
-            </a:r>
-          </a:p>
-        </p:txBody>
-      </p:sp>
-      <p:sp>
-        <p:nvSpPr>
-          <p:cNvPr id="18" name="Rectangle 17">
-            <a:extLst>
-              <a:ext uri="{FF2B5EF4-FFF2-40B4-BE49-F238E27FC236}">
-                <a16:creationId xmlns:a16="http://schemas.microsoft.com/office/drawing/2014/main" id="{E99E26D2-2931-DDB9-812B-B7F2A39C3961}"/>
-              </a:ext>
-            </a:extLst>
-          </p:cNvPr>
-          <p:cNvSpPr/>
-          <p:nvPr/>
-        </p:nvSpPr>
-        <p:spPr>
-          <a:xfrm>
-            <a:off x="4495435" y="310243"/>
-            <a:ext cx="3951514" cy="6237514"/>
-          </a:xfrm>
-          <a:prstGeom prst="rect">
-            <a:avLst/>
-          </a:prstGeom>
-        </p:spPr>
-        <p:style>
-          <a:lnRef idx="2">
-            <a:schemeClr val="accent6"/>
-          </a:lnRef>
-          <a:fillRef idx="1">
-            <a:schemeClr val="lt1"/>
-          </a:fillRef>
-          <a:effectRef idx="0">
-            <a:schemeClr val="accent6"/>
-          </a:effectRef>
-          <a:fontRef idx="minor">
-            <a:schemeClr val="dk1"/>
-          </a:fontRef>
-        </p:style>
-        <p:txBody>
-          <a:bodyPr rtlCol="0" anchor="ctr"/>
-          <a:lstStyle/>
-          <a:p>
-            <a:pPr algn="ctr"/>
-            <a:endParaRPr lang="en-US" dirty="0"/>
-          </a:p>
-        </p:txBody>
-      </p:sp>
-      <p:sp>
-        <p:nvSpPr>
-          <p:cNvPr id="19" name="Rectangle 18">
-            <a:extLst>
-              <a:ext uri="{FF2B5EF4-FFF2-40B4-BE49-F238E27FC236}">
-                <a16:creationId xmlns:a16="http://schemas.microsoft.com/office/drawing/2014/main" id="{9104525A-3EDD-3021-7A3F-856EA7687BD6}"/>
-              </a:ext>
-            </a:extLst>
-          </p:cNvPr>
-          <p:cNvSpPr/>
-          <p:nvPr/>
-        </p:nvSpPr>
-        <p:spPr>
-          <a:xfrm>
-            <a:off x="4495435" y="310243"/>
-            <a:ext cx="3951514" cy="903514"/>
-          </a:xfrm>
-          <a:prstGeom prst="rect">
-            <a:avLst/>
-          </a:prstGeom>
-        </p:spPr>
-        <p:style>
-          <a:lnRef idx="2">
-            <a:schemeClr val="accent6"/>
-          </a:lnRef>
-          <a:fillRef idx="1">
-            <a:schemeClr val="lt1"/>
-          </a:fillRef>
-          <a:effectRef idx="0">
-            <a:schemeClr val="accent6"/>
-          </a:effectRef>
-          <a:fontRef idx="minor">
-            <a:schemeClr val="dk1"/>
-          </a:fontRef>
-        </p:style>
-        <p:txBody>
-          <a:bodyPr rtlCol="0" anchor="ctr"/>
-          <a:lstStyle/>
-          <a:p>
-            <a:pPr algn="ctr"/>
-            <a:r>
-              <a:rPr lang="en-US" b="1" u="sng" dirty="0"/>
-              <a:t>X</a:t>
-            </a:r>
             <a:r>
               <a:rPr lang="en-US" dirty="0"/>
-              <a:t> </a:t>
-            </a:r>
-            <a:r>
-              <a:rPr lang="en-US" i="1" dirty="0"/>
-              <a:t>Marks the Spot</a:t>
-            </a:r>
-          </a:p>
-        </p:txBody>
-      </p:sp>
-      <p:pic>
-        <p:nvPicPr>
-          <p:cNvPr id="23" name="Graphic 22" descr="Tic Tac Toe outline">
-            <a:extLst>
-              <a:ext uri="{FF2B5EF4-FFF2-40B4-BE49-F238E27FC236}">
-                <a16:creationId xmlns:a16="http://schemas.microsoft.com/office/drawing/2014/main" id="{782717BF-0616-ED3B-930B-A336283F5709}"/>
-              </a:ext>
-            </a:extLst>
-          </p:cNvPr>
-          <p:cNvPicPr>
-            <a:picLocks noChangeAspect="1"/>
-          </p:cNvPicPr>
-          <p:nvPr/>
-        </p:nvPicPr>
-        <p:blipFill>
-          <a:blip r:embed="rId2">
-            <a:extLst>
-              <a:ext uri="{96DAC541-7B7A-43D3-8B79-37D633B846F1}">
-                <asvg:svgBlip xmlns:asvg="http://schemas.microsoft.com/office/drawing/2016/SVG/main" r:embed="rId3"/>
-              </a:ext>
-            </a:extLst>
-          </a:blip>
-          <a:stretch>
-            <a:fillRect/>
-          </a:stretch>
-        </p:blipFill>
-        <p:spPr>
-          <a:xfrm>
-            <a:off x="4593406" y="429986"/>
-            <a:ext cx="664028" cy="664028"/>
-          </a:xfrm>
-          <a:prstGeom prst="rect">
-            <a:avLst/>
-          </a:prstGeom>
-        </p:spPr>
-      </p:pic>
-      <p:sp>
-        <p:nvSpPr>
-          <p:cNvPr id="28" name="Rectangle 27">
-            <a:extLst>
-              <a:ext uri="{FF2B5EF4-FFF2-40B4-BE49-F238E27FC236}">
-                <a16:creationId xmlns:a16="http://schemas.microsoft.com/office/drawing/2014/main" id="{E0819C01-2586-0EC4-3B76-9E13E12EE2F1}"/>
-              </a:ext>
-            </a:extLst>
-          </p:cNvPr>
-          <p:cNvSpPr/>
-          <p:nvPr/>
-        </p:nvSpPr>
-        <p:spPr>
-          <a:xfrm>
-            <a:off x="4866277" y="2445388"/>
-            <a:ext cx="1066799" cy="827314"/>
-          </a:xfrm>
-          <a:prstGeom prst="rect">
-            <a:avLst/>
-          </a:prstGeom>
-        </p:spPr>
-        <p:style>
-          <a:lnRef idx="2">
-            <a:schemeClr val="accent6"/>
-          </a:lnRef>
-          <a:fillRef idx="1">
-            <a:schemeClr val="lt1"/>
-          </a:fillRef>
-          <a:effectRef idx="0">
-            <a:schemeClr val="accent6"/>
-          </a:effectRef>
-          <a:fontRef idx="minor">
-            <a:schemeClr val="dk1"/>
-          </a:fontRef>
-        </p:style>
-        <p:txBody>
-          <a:bodyPr rtlCol="0" anchor="ctr"/>
-          <a:lstStyle/>
-          <a:p>
-            <a:pPr algn="ctr"/>
-            <a:endParaRPr lang="en-US"/>
-          </a:p>
-        </p:txBody>
-      </p:sp>
-      <p:sp>
-        <p:nvSpPr>
-          <p:cNvPr id="29" name="Rectangle 28">
-            <a:extLst>
-              <a:ext uri="{FF2B5EF4-FFF2-40B4-BE49-F238E27FC236}">
-                <a16:creationId xmlns:a16="http://schemas.microsoft.com/office/drawing/2014/main" id="{8FE791BD-3BA7-C2EE-58BC-48A996DADFD1}"/>
-              </a:ext>
-            </a:extLst>
-          </p:cNvPr>
-          <p:cNvSpPr/>
-          <p:nvPr/>
-        </p:nvSpPr>
-        <p:spPr>
-          <a:xfrm>
-            <a:off x="5933073" y="2445388"/>
-            <a:ext cx="1066799" cy="827314"/>
-          </a:xfrm>
-          <a:prstGeom prst="rect">
-            <a:avLst/>
-          </a:prstGeom>
-        </p:spPr>
-        <p:style>
-          <a:lnRef idx="2">
-            <a:schemeClr val="accent6"/>
-          </a:lnRef>
-          <a:fillRef idx="1">
-            <a:schemeClr val="lt1"/>
-          </a:fillRef>
-          <a:effectRef idx="0">
-            <a:schemeClr val="accent6"/>
-          </a:effectRef>
-          <a:fontRef idx="minor">
-            <a:schemeClr val="dk1"/>
-          </a:fontRef>
-        </p:style>
-        <p:txBody>
-          <a:bodyPr rtlCol="0" anchor="ctr"/>
-          <a:lstStyle/>
-          <a:p>
-            <a:pPr algn="ctr"/>
-            <a:endParaRPr lang="en-US"/>
-          </a:p>
-        </p:txBody>
-      </p:sp>
-      <p:sp>
-        <p:nvSpPr>
-          <p:cNvPr id="30" name="Rectangle 29">
-            <a:extLst>
-              <a:ext uri="{FF2B5EF4-FFF2-40B4-BE49-F238E27FC236}">
-                <a16:creationId xmlns:a16="http://schemas.microsoft.com/office/drawing/2014/main" id="{5A116305-A828-B84E-4925-1843E5A9B166}"/>
-              </a:ext>
-            </a:extLst>
-          </p:cNvPr>
-          <p:cNvSpPr/>
-          <p:nvPr/>
-        </p:nvSpPr>
-        <p:spPr>
-          <a:xfrm>
-            <a:off x="6999869" y="2445388"/>
-            <a:ext cx="1066799" cy="827314"/>
-          </a:xfrm>
-          <a:prstGeom prst="rect">
-            <a:avLst/>
-          </a:prstGeom>
-        </p:spPr>
-        <p:style>
-          <a:lnRef idx="2">
-            <a:schemeClr val="accent6"/>
-          </a:lnRef>
-          <a:fillRef idx="1">
-            <a:schemeClr val="lt1"/>
-          </a:fillRef>
-          <a:effectRef idx="0">
-            <a:schemeClr val="accent6"/>
-          </a:effectRef>
-          <a:fontRef idx="minor">
-            <a:schemeClr val="dk1"/>
-          </a:fontRef>
-        </p:style>
-        <p:txBody>
-          <a:bodyPr rtlCol="0" anchor="ctr"/>
-          <a:lstStyle/>
-          <a:p>
-            <a:pPr algn="ctr"/>
-            <a:endParaRPr lang="en-US"/>
-          </a:p>
-        </p:txBody>
-      </p:sp>
-      <p:sp>
-        <p:nvSpPr>
-          <p:cNvPr id="31" name="Rectangle 30">
-            <a:extLst>
-              <a:ext uri="{FF2B5EF4-FFF2-40B4-BE49-F238E27FC236}">
-                <a16:creationId xmlns:a16="http://schemas.microsoft.com/office/drawing/2014/main" id="{AAC298B6-3437-9208-51D5-0DD26F7DB354}"/>
-              </a:ext>
-            </a:extLst>
-          </p:cNvPr>
-          <p:cNvSpPr/>
-          <p:nvPr/>
-        </p:nvSpPr>
-        <p:spPr>
-          <a:xfrm>
-            <a:off x="4866277" y="3280868"/>
-            <a:ext cx="1066799" cy="827314"/>
-          </a:xfrm>
-          <a:prstGeom prst="rect">
-            <a:avLst/>
-          </a:prstGeom>
-        </p:spPr>
-        <p:style>
-          <a:lnRef idx="2">
-            <a:schemeClr val="accent6"/>
-          </a:lnRef>
-          <a:fillRef idx="1">
-            <a:schemeClr val="lt1"/>
-          </a:fillRef>
-          <a:effectRef idx="0">
-            <a:schemeClr val="accent6"/>
-          </a:effectRef>
-          <a:fontRef idx="minor">
-            <a:schemeClr val="dk1"/>
-          </a:fontRef>
-        </p:style>
-        <p:txBody>
-          <a:bodyPr rtlCol="0" anchor="ctr"/>
-          <a:lstStyle/>
-          <a:p>
-            <a:pPr algn="ctr"/>
-            <a:endParaRPr lang="en-US"/>
-          </a:p>
-        </p:txBody>
-      </p:sp>
-      <p:sp>
-        <p:nvSpPr>
-          <p:cNvPr id="32" name="Rectangle 31">
-            <a:extLst>
-              <a:ext uri="{FF2B5EF4-FFF2-40B4-BE49-F238E27FC236}">
-                <a16:creationId xmlns:a16="http://schemas.microsoft.com/office/drawing/2014/main" id="{CE62797F-0181-8430-75B0-25355B8CCA85}"/>
-              </a:ext>
-            </a:extLst>
-          </p:cNvPr>
-          <p:cNvSpPr/>
-          <p:nvPr/>
-        </p:nvSpPr>
-        <p:spPr>
-          <a:xfrm>
-            <a:off x="5933073" y="3280868"/>
-            <a:ext cx="1066799" cy="827314"/>
-          </a:xfrm>
-          <a:prstGeom prst="rect">
-            <a:avLst/>
-          </a:prstGeom>
-        </p:spPr>
-        <p:style>
-          <a:lnRef idx="2">
-            <a:schemeClr val="accent6"/>
-          </a:lnRef>
-          <a:fillRef idx="1">
-            <a:schemeClr val="lt1"/>
-          </a:fillRef>
-          <a:effectRef idx="0">
-            <a:schemeClr val="accent6"/>
-          </a:effectRef>
-          <a:fontRef idx="minor">
-            <a:schemeClr val="dk1"/>
-          </a:fontRef>
-        </p:style>
-        <p:txBody>
-          <a:bodyPr rtlCol="0" anchor="ctr"/>
-          <a:lstStyle/>
-          <a:p>
-            <a:pPr algn="ctr"/>
-            <a:endParaRPr lang="en-US"/>
-          </a:p>
-        </p:txBody>
-      </p:sp>
-      <p:sp>
-        <p:nvSpPr>
-          <p:cNvPr id="33" name="Rectangle 32">
-            <a:extLst>
-              <a:ext uri="{FF2B5EF4-FFF2-40B4-BE49-F238E27FC236}">
-                <a16:creationId xmlns:a16="http://schemas.microsoft.com/office/drawing/2014/main" id="{99D9AE0C-E2C7-3838-3F3A-BF904E2227AD}"/>
-              </a:ext>
-            </a:extLst>
-          </p:cNvPr>
-          <p:cNvSpPr/>
-          <p:nvPr/>
-        </p:nvSpPr>
-        <p:spPr>
-          <a:xfrm>
-            <a:off x="6999869" y="3280868"/>
-            <a:ext cx="1066799" cy="827314"/>
-          </a:xfrm>
-          <a:prstGeom prst="rect">
-            <a:avLst/>
-          </a:prstGeom>
-        </p:spPr>
-        <p:style>
-          <a:lnRef idx="2">
-            <a:schemeClr val="accent6"/>
-          </a:lnRef>
-          <a:fillRef idx="1">
-            <a:schemeClr val="lt1"/>
-          </a:fillRef>
-          <a:effectRef idx="0">
-            <a:schemeClr val="accent6"/>
-          </a:effectRef>
-          <a:fontRef idx="minor">
-            <a:schemeClr val="dk1"/>
-          </a:fontRef>
-        </p:style>
-        <p:txBody>
-          <a:bodyPr rtlCol="0" anchor="ctr"/>
-          <a:lstStyle/>
-          <a:p>
-            <a:pPr algn="ctr"/>
-            <a:endParaRPr lang="en-US"/>
-          </a:p>
-        </p:txBody>
-      </p:sp>
-      <p:sp>
-        <p:nvSpPr>
-          <p:cNvPr id="34" name="Rectangle 33">
-            <a:extLst>
-              <a:ext uri="{FF2B5EF4-FFF2-40B4-BE49-F238E27FC236}">
-                <a16:creationId xmlns:a16="http://schemas.microsoft.com/office/drawing/2014/main" id="{FAA6E11C-680D-2B29-913C-E35813B8B608}"/>
-              </a:ext>
-            </a:extLst>
-          </p:cNvPr>
-          <p:cNvSpPr/>
-          <p:nvPr/>
-        </p:nvSpPr>
-        <p:spPr>
-          <a:xfrm>
-            <a:off x="4866277" y="4108182"/>
-            <a:ext cx="1066799" cy="827314"/>
-          </a:xfrm>
-          <a:prstGeom prst="rect">
-            <a:avLst/>
-          </a:prstGeom>
-        </p:spPr>
-        <p:style>
-          <a:lnRef idx="2">
-            <a:schemeClr val="accent6"/>
-          </a:lnRef>
-          <a:fillRef idx="1">
-            <a:schemeClr val="lt1"/>
-          </a:fillRef>
-          <a:effectRef idx="0">
-            <a:schemeClr val="accent6"/>
-          </a:effectRef>
-          <a:fontRef idx="minor">
-            <a:schemeClr val="dk1"/>
-          </a:fontRef>
-        </p:style>
-        <p:txBody>
-          <a:bodyPr rtlCol="0" anchor="ctr"/>
-          <a:lstStyle/>
-          <a:p>
-            <a:pPr algn="ctr"/>
-            <a:endParaRPr lang="en-US"/>
-          </a:p>
-        </p:txBody>
-      </p:sp>
-      <p:sp>
-        <p:nvSpPr>
-          <p:cNvPr id="35" name="Rectangle 34">
-            <a:extLst>
-              <a:ext uri="{FF2B5EF4-FFF2-40B4-BE49-F238E27FC236}">
-                <a16:creationId xmlns:a16="http://schemas.microsoft.com/office/drawing/2014/main" id="{E4A7D28C-1146-333A-48A4-7F7025385B67}"/>
-              </a:ext>
-            </a:extLst>
-          </p:cNvPr>
-          <p:cNvSpPr/>
-          <p:nvPr/>
-        </p:nvSpPr>
-        <p:spPr>
-          <a:xfrm>
-            <a:off x="5933073" y="4108182"/>
-            <a:ext cx="1066799" cy="827314"/>
-          </a:xfrm>
-          <a:prstGeom prst="rect">
-            <a:avLst/>
-          </a:prstGeom>
-        </p:spPr>
-        <p:style>
-          <a:lnRef idx="2">
-            <a:schemeClr val="accent6"/>
-          </a:lnRef>
-          <a:fillRef idx="1">
-            <a:schemeClr val="lt1"/>
-          </a:fillRef>
-          <a:effectRef idx="0">
-            <a:schemeClr val="accent6"/>
-          </a:effectRef>
-          <a:fontRef idx="minor">
-            <a:schemeClr val="dk1"/>
-          </a:fontRef>
-        </p:style>
-        <p:txBody>
-          <a:bodyPr rtlCol="0" anchor="ctr"/>
-          <a:lstStyle/>
-          <a:p>
-            <a:pPr algn="ctr"/>
-            <a:endParaRPr lang="en-US"/>
-          </a:p>
-        </p:txBody>
-      </p:sp>
-      <p:sp>
-        <p:nvSpPr>
-          <p:cNvPr id="36" name="Rectangle 35">
-            <a:extLst>
-              <a:ext uri="{FF2B5EF4-FFF2-40B4-BE49-F238E27FC236}">
-                <a16:creationId xmlns:a16="http://schemas.microsoft.com/office/drawing/2014/main" id="{B7D9BE0B-10C1-5CD6-C2E7-BC2E961DE9C0}"/>
-              </a:ext>
-            </a:extLst>
-          </p:cNvPr>
-          <p:cNvSpPr/>
-          <p:nvPr/>
-        </p:nvSpPr>
-        <p:spPr>
-          <a:xfrm>
-            <a:off x="6999869" y="4108182"/>
-            <a:ext cx="1066799" cy="827314"/>
-          </a:xfrm>
-          <a:prstGeom prst="rect">
-            <a:avLst/>
-          </a:prstGeom>
-        </p:spPr>
-        <p:style>
-          <a:lnRef idx="2">
-            <a:schemeClr val="accent6"/>
-          </a:lnRef>
-          <a:fillRef idx="1">
-            <a:schemeClr val="lt1"/>
-          </a:fillRef>
-          <a:effectRef idx="0">
-            <a:schemeClr val="accent6"/>
-          </a:effectRef>
-          <a:fontRef idx="minor">
-            <a:schemeClr val="dk1"/>
-          </a:fontRef>
-        </p:style>
-        <p:txBody>
-          <a:bodyPr rtlCol="0" anchor="ctr"/>
-          <a:lstStyle/>
-          <a:p>
-            <a:pPr algn="ctr"/>
-            <a:endParaRPr lang="en-US"/>
+              <a:t>card</a:t>
+            </a:r>
           </a:p>
         </p:txBody>
       </p:sp>

</xml_diff>